<commit_message>
Finnished presentation and polished doc
</commit_message>
<xml_diff>
--- a/First_Delivery/presentation/CI_G15.pptx
+++ b/First_Delivery/presentation/CI_G15.pptx
@@ -4461,7 +4461,75 @@
                   <a:schemeClr val="tx1"/>
                 </a:solidFill>
               </a:rPr>
-              <a:t>Reading habits and academic success</a:t>
+              <a:t>Reading habits Vs : </a:t>
+            </a:r>
+          </a:p>
+          <a:p>
+            <a:pPr marL="571500" indent="-571500">
+              <a:spcBef>
+                <a:spcPts val="0"/>
+              </a:spcBef>
+              <a:buFont typeface="Arial" panose="020B0604020202020204" pitchFamily="34" charset="0"/>
+              <a:buChar char="•"/>
+            </a:pPr>
+            <a:r>
+              <a:rPr lang="en-US" sz="3600" b="0" dirty="0">
+                <a:solidFill>
+                  <a:schemeClr val="tx1"/>
+                </a:solidFill>
+              </a:rPr>
+              <a:t>Academic performance</a:t>
+            </a:r>
+          </a:p>
+          <a:p>
+            <a:pPr marL="571500" indent="-571500">
+              <a:spcBef>
+                <a:spcPts val="0"/>
+              </a:spcBef>
+              <a:buFont typeface="Arial" panose="020B0604020202020204" pitchFamily="34" charset="0"/>
+              <a:buChar char="•"/>
+            </a:pPr>
+            <a:r>
+              <a:rPr lang="en-US" sz="3600" b="0" dirty="0">
+                <a:solidFill>
+                  <a:schemeClr val="tx1"/>
+                </a:solidFill>
+              </a:rPr>
+              <a:t>Education dropout</a:t>
+            </a:r>
+          </a:p>
+          <a:p>
+            <a:pPr marL="571500" indent="-571500">
+              <a:spcBef>
+                <a:spcPts val="0"/>
+              </a:spcBef>
+              <a:buFont typeface="Arial" panose="020B0604020202020204" pitchFamily="34" charset="0"/>
+              <a:buChar char="•"/>
+            </a:pPr>
+            <a:r>
+              <a:rPr lang="en-US" sz="3600" b="0" dirty="0">
+                <a:solidFill>
+                  <a:schemeClr val="tx1"/>
+                </a:solidFill>
+              </a:rPr>
+              <a:t>Level of literacy</a:t>
+            </a:r>
+          </a:p>
+          <a:p>
+            <a:pPr marL="571500" indent="-571500">
+              <a:spcBef>
+                <a:spcPts val="0"/>
+              </a:spcBef>
+              <a:buFont typeface="Arial" panose="020B0604020202020204" pitchFamily="34" charset="0"/>
+              <a:buChar char="•"/>
+            </a:pPr>
+            <a:r>
+              <a:rPr lang="en-US" sz="3600" b="0" dirty="0">
+                <a:solidFill>
+                  <a:schemeClr val="tx1"/>
+                </a:solidFill>
+              </a:rPr>
+              <a:t>Education engagement</a:t>
             </a:r>
           </a:p>
         </p:txBody>

</xml_diff>

<commit_message>
New version of the ppt presentation
</commit_message>
<xml_diff>
--- a/First_Delivery/presentation/CI_G15.pptx
+++ b/First_Delivery/presentation/CI_G15.pptx
@@ -223,7 +223,7 @@
           <a:p>
             <a:fld id="{745C36E7-9E00-462E-80A3-32F2BE615C7A}" type="datetimeFigureOut">
               <a:rPr lang="en-US" smtClean="0"/>
-              <a:t>01-Oct-19</a:t>
+              <a:t>02-Oct-19</a:t>
             </a:fld>
             <a:endParaRPr lang="en-US"/>
           </a:p>
@@ -389,7 +389,7 @@
             <a:fld id="{01F3E309-ED8D-4193-99AF-E5EA90965E98}" type="datetimeFigureOut">
               <a:rPr lang="en-US" smtClean="0"/>
               <a:pPr/>
-              <a:t>01-Oct-19</a:t>
+              <a:t>02-Oct-19</a:t>
             </a:fld>
             <a:endParaRPr lang="en-US"/>
           </a:p>
@@ -703,7 +703,64 @@
           <a:bodyPr/>
           <a:lstStyle/>
           <a:p>
-            <a:endParaRPr lang="en-US" baseline="0" dirty="0"/>
+            <a:pPr marL="171450" indent="-171450">
+              <a:buFontTx/>
+              <a:buChar char="-"/>
+            </a:pPr>
+            <a:r>
+              <a:rPr lang="en-US" baseline="0" dirty="0"/>
+              <a:t>Description – Reading is important</a:t>
+            </a:r>
+          </a:p>
+          <a:p>
+            <a:pPr marL="171450" indent="-171450">
+              <a:buFontTx/>
+              <a:buChar char="-"/>
+            </a:pPr>
+            <a:r>
+              <a:rPr lang="en-US" baseline="0" dirty="0"/>
+              <a:t>Motivation:</a:t>
+            </a:r>
+          </a:p>
+          <a:p>
+            <a:pPr marL="628650" lvl="1" indent="-171450">
+              <a:buFontTx/>
+              <a:buChar char="-"/>
+            </a:pPr>
+            <a:r>
+              <a:rPr lang="en-US" baseline="0" dirty="0"/>
+              <a:t>Reading habits impact on development of cognitive abilities</a:t>
+            </a:r>
+          </a:p>
+          <a:p>
+            <a:pPr marL="1085850" lvl="2" indent="-171450">
+              <a:buFontTx/>
+              <a:buChar char="-"/>
+            </a:pPr>
+            <a:r>
+              <a:rPr lang="en-US" baseline="0" dirty="0"/>
+              <a:t>Creativity </a:t>
+            </a:r>
+          </a:p>
+          <a:p>
+            <a:pPr marL="1085850" lvl="2" indent="-171450">
+              <a:buFontTx/>
+              <a:buChar char="-"/>
+            </a:pPr>
+            <a:r>
+              <a:rPr lang="en-US" baseline="0" dirty="0"/>
+              <a:t>Think out of the box</a:t>
+            </a:r>
+          </a:p>
+          <a:p>
+            <a:pPr marL="628650" lvl="1" indent="-171450">
+              <a:buFontTx/>
+              <a:buChar char="-"/>
+            </a:pPr>
+            <a:r>
+              <a:rPr lang="en-US" baseline="0" dirty="0"/>
+              <a:t>Relation between reading habits and …</a:t>
+            </a:r>
           </a:p>
         </p:txBody>
       </p:sp>
@@ -788,6 +845,373 @@
           <a:bodyPr/>
           <a:lstStyle/>
           <a:p>
+            <a:pPr marL="0" marR="0" lvl="0" indent="0" algn="l" defTabSz="914400" rtl="0" eaLnBrk="1" fontAlgn="auto" latinLnBrk="0" hangingPunct="1">
+              <a:lnSpc>
+                <a:spcPct val="100000"/>
+              </a:lnSpc>
+              <a:spcBef>
+                <a:spcPts val="0"/>
+              </a:spcBef>
+              <a:spcAft>
+                <a:spcPts val="0"/>
+              </a:spcAft>
+              <a:buClrTx/>
+              <a:buSzTx/>
+              <a:buFontTx/>
+              <a:buNone/>
+              <a:tabLst/>
+              <a:defRPr/>
+            </a:pPr>
+            <a:r>
+              <a:rPr lang="pt-PT" dirty="0" err="1"/>
+              <a:t>One</a:t>
+            </a:r>
+            <a:r>
+              <a:rPr lang="pt-PT" dirty="0"/>
+              <a:t> </a:t>
+            </a:r>
+            <a:r>
+              <a:rPr lang="pt-PT" dirty="0" err="1"/>
+              <a:t>of</a:t>
+            </a:r>
+            <a:r>
+              <a:rPr lang="pt-PT" dirty="0"/>
+              <a:t> </a:t>
+            </a:r>
+            <a:r>
+              <a:rPr lang="pt-PT" dirty="0" err="1"/>
+              <a:t>the</a:t>
+            </a:r>
+            <a:r>
+              <a:rPr lang="pt-PT" dirty="0"/>
+              <a:t> </a:t>
+            </a:r>
+            <a:r>
+              <a:rPr lang="pt-PT" dirty="0" err="1"/>
+              <a:t>challenges</a:t>
+            </a:r>
+            <a:r>
+              <a:rPr lang="pt-PT" dirty="0"/>
+              <a:t> </a:t>
+            </a:r>
+            <a:r>
+              <a:rPr lang="pt-PT" dirty="0" err="1"/>
+              <a:t>we</a:t>
+            </a:r>
+            <a:r>
+              <a:rPr lang="pt-PT" dirty="0"/>
+              <a:t> face </a:t>
+            </a:r>
+            <a:r>
+              <a:rPr lang="pt-PT" dirty="0" err="1"/>
+              <a:t>is</a:t>
+            </a:r>
+            <a:r>
+              <a:rPr lang="pt-PT" dirty="0"/>
+              <a:t> to </a:t>
+            </a:r>
+            <a:r>
+              <a:rPr lang="pt-PT" dirty="0" err="1"/>
+              <a:t>aquire</a:t>
+            </a:r>
+            <a:r>
+              <a:rPr lang="pt-PT" dirty="0"/>
+              <a:t> </a:t>
+            </a:r>
+            <a:r>
+              <a:rPr lang="pt-PT" dirty="0" err="1"/>
+              <a:t>the</a:t>
+            </a:r>
+            <a:r>
+              <a:rPr lang="pt-PT" dirty="0"/>
+              <a:t> </a:t>
+            </a:r>
+            <a:r>
+              <a:rPr lang="pt-PT" dirty="0" err="1"/>
+              <a:t>necessary</a:t>
+            </a:r>
+            <a:r>
+              <a:rPr lang="pt-PT" dirty="0"/>
+              <a:t> </a:t>
+            </a:r>
+            <a:r>
+              <a:rPr lang="pt-PT" dirty="0" err="1"/>
+              <a:t>and</a:t>
+            </a:r>
+            <a:r>
+              <a:rPr lang="pt-PT" dirty="0"/>
+              <a:t> </a:t>
+            </a:r>
+            <a:r>
+              <a:rPr lang="pt-PT" dirty="0" err="1"/>
+              <a:t>reliable</a:t>
+            </a:r>
+            <a:r>
+              <a:rPr lang="pt-PT" dirty="0"/>
+              <a:t> </a:t>
+            </a:r>
+            <a:r>
+              <a:rPr lang="pt-PT" dirty="0" err="1"/>
+              <a:t>datasets</a:t>
+            </a:r>
+            <a:r>
+              <a:rPr lang="pt-PT" dirty="0"/>
+              <a:t> to </a:t>
+            </a:r>
+            <a:r>
+              <a:rPr lang="pt-PT" dirty="0" err="1"/>
+              <a:t>answer</a:t>
+            </a:r>
+            <a:r>
+              <a:rPr lang="pt-PT" dirty="0"/>
+              <a:t> </a:t>
+            </a:r>
+            <a:r>
+              <a:rPr lang="pt-PT" dirty="0" err="1"/>
+              <a:t>the</a:t>
+            </a:r>
+            <a:r>
+              <a:rPr lang="pt-PT" dirty="0"/>
+              <a:t> </a:t>
+            </a:r>
+            <a:r>
+              <a:rPr lang="pt-PT" dirty="0" err="1"/>
+              <a:t>questions</a:t>
+            </a:r>
+            <a:r>
+              <a:rPr lang="pt-PT" dirty="0"/>
+              <a:t> </a:t>
+            </a:r>
+            <a:r>
+              <a:rPr lang="pt-PT" dirty="0" err="1"/>
+              <a:t>that</a:t>
+            </a:r>
+            <a:r>
+              <a:rPr lang="pt-PT" dirty="0"/>
+              <a:t> are </a:t>
+            </a:r>
+            <a:r>
+              <a:rPr lang="pt-PT" dirty="0" err="1"/>
+              <a:t>going</a:t>
+            </a:r>
+            <a:r>
+              <a:rPr lang="pt-PT" dirty="0"/>
+              <a:t> to </a:t>
+            </a:r>
+            <a:r>
+              <a:rPr lang="pt-PT" dirty="0" err="1"/>
+              <a:t>be</a:t>
+            </a:r>
+            <a:r>
+              <a:rPr lang="pt-PT" dirty="0"/>
+              <a:t> </a:t>
+            </a:r>
+            <a:r>
+              <a:rPr lang="pt-PT" dirty="0" err="1"/>
+              <a:t>presented</a:t>
+            </a:r>
+            <a:r>
+              <a:rPr lang="pt-PT" dirty="0"/>
+              <a:t>.</a:t>
+            </a:r>
+          </a:p>
+          <a:p>
+            <a:pPr marL="0" marR="0" lvl="0" indent="0" algn="l" defTabSz="914400" rtl="0" eaLnBrk="1" fontAlgn="auto" latinLnBrk="0" hangingPunct="1">
+              <a:lnSpc>
+                <a:spcPct val="100000"/>
+              </a:lnSpc>
+              <a:spcBef>
+                <a:spcPts val="0"/>
+              </a:spcBef>
+              <a:spcAft>
+                <a:spcPts val="0"/>
+              </a:spcAft>
+              <a:buClrTx/>
+              <a:buSzTx/>
+              <a:buFontTx/>
+              <a:buNone/>
+              <a:tabLst/>
+              <a:defRPr/>
+            </a:pPr>
+            <a:r>
+              <a:rPr lang="pt-PT" dirty="0" err="1"/>
+              <a:t>Now</a:t>
+            </a:r>
+            <a:r>
+              <a:rPr lang="pt-PT" dirty="0"/>
+              <a:t> Max </a:t>
+            </a:r>
+            <a:r>
+              <a:rPr lang="pt-PT" dirty="0" err="1"/>
+              <a:t>is</a:t>
+            </a:r>
+            <a:r>
+              <a:rPr lang="pt-PT" dirty="0"/>
+              <a:t> </a:t>
+            </a:r>
+            <a:r>
+              <a:rPr lang="pt-PT" dirty="0" err="1"/>
+              <a:t>going</a:t>
+            </a:r>
+            <a:r>
+              <a:rPr lang="pt-PT" dirty="0"/>
+              <a:t> to </a:t>
+            </a:r>
+            <a:r>
+              <a:rPr lang="pt-PT" dirty="0" err="1"/>
+              <a:t>present</a:t>
+            </a:r>
+            <a:r>
+              <a:rPr lang="pt-PT" dirty="0"/>
+              <a:t> some </a:t>
+            </a:r>
+            <a:r>
+              <a:rPr lang="pt-PT" dirty="0" err="1"/>
+              <a:t>of</a:t>
+            </a:r>
+            <a:r>
+              <a:rPr lang="pt-PT" dirty="0"/>
+              <a:t> </a:t>
+            </a:r>
+            <a:r>
+              <a:rPr lang="pt-PT" dirty="0" err="1"/>
+              <a:t>the</a:t>
+            </a:r>
+            <a:r>
+              <a:rPr lang="pt-PT" dirty="0"/>
+              <a:t> </a:t>
+            </a:r>
+            <a:r>
+              <a:rPr lang="pt-PT" dirty="0" err="1"/>
+              <a:t>questions</a:t>
+            </a:r>
+            <a:r>
+              <a:rPr lang="pt-PT" dirty="0"/>
+              <a:t> </a:t>
+            </a:r>
+            <a:r>
+              <a:rPr lang="pt-PT" dirty="0" err="1"/>
+              <a:t>that</a:t>
+            </a:r>
+            <a:r>
+              <a:rPr lang="pt-PT" dirty="0"/>
+              <a:t> </a:t>
+            </a:r>
+            <a:r>
+              <a:rPr lang="pt-PT" dirty="0" err="1"/>
+              <a:t>we</a:t>
+            </a:r>
+            <a:r>
+              <a:rPr lang="pt-PT" dirty="0"/>
+              <a:t> </a:t>
+            </a:r>
+            <a:r>
+              <a:rPr lang="pt-PT" dirty="0" err="1"/>
+              <a:t>intend</a:t>
+            </a:r>
+            <a:r>
+              <a:rPr lang="pt-PT" dirty="0"/>
+              <a:t> to </a:t>
+            </a:r>
+            <a:r>
+              <a:rPr lang="pt-PT" dirty="0" err="1"/>
+              <a:t>answear</a:t>
+            </a:r>
+            <a:r>
+              <a:rPr lang="pt-PT" dirty="0"/>
+              <a:t> </a:t>
+            </a:r>
+            <a:r>
+              <a:rPr lang="pt-PT" dirty="0" err="1"/>
+              <a:t>with</a:t>
+            </a:r>
+            <a:r>
+              <a:rPr lang="pt-PT" dirty="0"/>
+              <a:t> </a:t>
+            </a:r>
+            <a:r>
+              <a:rPr lang="pt-PT" dirty="0" err="1"/>
+              <a:t>the</a:t>
+            </a:r>
+            <a:r>
+              <a:rPr lang="pt-PT" dirty="0"/>
+              <a:t> </a:t>
+            </a:r>
+            <a:r>
+              <a:rPr lang="pt-PT" dirty="0" err="1"/>
+              <a:t>datasets</a:t>
+            </a:r>
+            <a:r>
+              <a:rPr lang="pt-PT" dirty="0"/>
+              <a:t> </a:t>
+            </a:r>
+            <a:r>
+              <a:rPr lang="pt-PT" dirty="0" err="1"/>
+              <a:t>that</a:t>
+            </a:r>
+            <a:r>
+              <a:rPr lang="pt-PT" dirty="0"/>
+              <a:t> </a:t>
+            </a:r>
+            <a:r>
+              <a:rPr lang="pt-PT" dirty="0" err="1"/>
+              <a:t>we</a:t>
+            </a:r>
+            <a:r>
+              <a:rPr lang="pt-PT" dirty="0"/>
+              <a:t> </a:t>
+            </a:r>
+            <a:r>
+              <a:rPr lang="pt-PT" dirty="0" err="1"/>
+              <a:t>aquire</a:t>
+            </a:r>
+            <a:r>
+              <a:rPr lang="pt-PT"/>
+              <a:t>.</a:t>
+            </a:r>
+            <a:endParaRPr lang="pt-PT" dirty="0"/>
+          </a:p>
+          <a:p>
+            <a:pPr marL="0" marR="0" lvl="0" indent="0" algn="l" defTabSz="914400" rtl="0" eaLnBrk="1" fontAlgn="auto" latinLnBrk="0" hangingPunct="1">
+              <a:lnSpc>
+                <a:spcPct val="100000"/>
+              </a:lnSpc>
+              <a:spcBef>
+                <a:spcPts val="0"/>
+              </a:spcBef>
+              <a:spcAft>
+                <a:spcPts val="0"/>
+              </a:spcAft>
+              <a:buClrTx/>
+              <a:buSzTx/>
+              <a:buFontTx/>
+              <a:buNone/>
+              <a:tabLst/>
+              <a:defRPr/>
+            </a:pPr>
+            <a:endParaRPr lang="pt-PT" dirty="0"/>
+          </a:p>
+          <a:p>
+            <a:pPr marL="0" marR="0" lvl="0" indent="0" algn="l" defTabSz="914400" rtl="0" eaLnBrk="1" fontAlgn="auto" latinLnBrk="0" hangingPunct="1">
+              <a:lnSpc>
+                <a:spcPct val="100000"/>
+              </a:lnSpc>
+              <a:spcBef>
+                <a:spcPts val="0"/>
+              </a:spcBef>
+              <a:spcAft>
+                <a:spcPts val="0"/>
+              </a:spcAft>
+              <a:buClrTx/>
+              <a:buSzTx/>
+              <a:buFontTx/>
+              <a:buNone/>
+              <a:tabLst/>
+              <a:defRPr/>
+            </a:pPr>
+            <a:endParaRPr lang="pt-PT" dirty="0"/>
+          </a:p>
+          <a:p>
             <a:endParaRPr lang="en-US" baseline="0" dirty="0"/>
           </a:p>
         </p:txBody>
@@ -848,6 +1272,91 @@
       </p:grpSpPr>
       <p:sp>
         <p:nvSpPr>
+          <p:cNvPr id="2" name="Marcador de Posição da Imagem do Diapositivo 1"/>
+          <p:cNvSpPr>
+            <a:spLocks noGrp="1" noRot="1" noChangeAspect="1"/>
+          </p:cNvSpPr>
+          <p:nvPr>
+            <p:ph type="sldImg"/>
+          </p:nvPr>
+        </p:nvSpPr>
+        <p:spPr/>
+      </p:sp>
+      <p:sp>
+        <p:nvSpPr>
+          <p:cNvPr id="3" name="Marcador de Posição de Notas 2"/>
+          <p:cNvSpPr>
+            <a:spLocks noGrp="1"/>
+          </p:cNvSpPr>
+          <p:nvPr>
+            <p:ph type="body" idx="1"/>
+          </p:nvPr>
+        </p:nvSpPr>
+        <p:spPr/>
+        <p:txBody>
+          <a:bodyPr/>
+          <a:lstStyle/>
+          <a:p>
+            <a:endParaRPr lang="pt-PT" dirty="0"/>
+          </a:p>
+        </p:txBody>
+      </p:sp>
+      <p:sp>
+        <p:nvSpPr>
+          <p:cNvPr id="4" name="Marcador de Posição do Número do Diapositivo 3"/>
+          <p:cNvSpPr>
+            <a:spLocks noGrp="1"/>
+          </p:cNvSpPr>
+          <p:nvPr>
+            <p:ph type="sldNum" sz="quarter" idx="5"/>
+          </p:nvPr>
+        </p:nvSpPr>
+        <p:spPr/>
+        <p:txBody>
+          <a:bodyPr/>
+          <a:lstStyle/>
+          <a:p>
+            <a:fld id="{F535F173-C1DD-4975-94BF-5B9ED67F7674}" type="slidenum">
+              <a:rPr lang="en-US" smtClean="0"/>
+              <a:pPr/>
+              <a:t>6</a:t>
+            </a:fld>
+            <a:endParaRPr lang="en-US"/>
+          </a:p>
+        </p:txBody>
+      </p:sp>
+    </p:spTree>
+    <p:extLst>
+      <p:ext uri="{BB962C8B-B14F-4D97-AF65-F5344CB8AC3E}">
+        <p14:creationId xmlns:p14="http://schemas.microsoft.com/office/powerpoint/2010/main" val="2332955102"/>
+      </p:ext>
+    </p:extLst>
+  </p:cSld>
+  <p:clrMapOvr>
+    <a:masterClrMapping/>
+  </p:clrMapOvr>
+</p:notes>
+</file>
+
+<file path=ppt/notesSlides/notesSlide4.xml><?xml version="1.0" encoding="utf-8"?>
+<p:notes xmlns:a="http://schemas.openxmlformats.org/drawingml/2006/main" xmlns:r="http://schemas.openxmlformats.org/officeDocument/2006/relationships" xmlns:p="http://schemas.openxmlformats.org/presentationml/2006/main">
+  <p:cSld>
+    <p:spTree>
+      <p:nvGrpSpPr>
+        <p:cNvPr id="1" name=""/>
+        <p:cNvGrpSpPr/>
+        <p:nvPr/>
+      </p:nvGrpSpPr>
+      <p:grpSpPr>
+        <a:xfrm>
+          <a:off x="0" y="0"/>
+          <a:ext cx="0" cy="0"/>
+          <a:chOff x="0" y="0"/>
+          <a:chExt cx="0" cy="0"/>
+        </a:xfrm>
+      </p:grpSpPr>
+      <p:sp>
+        <p:nvSpPr>
           <p:cNvPr id="2" name="Slide Image Placeholder 1"/>
           <p:cNvSpPr>
             <a:spLocks noGrp="1" noRot="1" noChangeAspect="1"/>
@@ -914,7 +1423,7 @@
 </p:notes>
 </file>
 
-<file path=ppt/notesSlides/notesSlide4.xml><?xml version="1.0" encoding="utf-8"?>
+<file path=ppt/notesSlides/notesSlide5.xml><?xml version="1.0" encoding="utf-8"?>
 <p:notes xmlns:a="http://schemas.openxmlformats.org/drawingml/2006/main" xmlns:r="http://schemas.openxmlformats.org/officeDocument/2006/relationships" xmlns:p="http://schemas.openxmlformats.org/presentationml/2006/main">
   <p:cSld>
     <p:spTree>
@@ -1491,7 +2000,7 @@
             <a:fld id="{F3CC9924-33BC-4796-B0F9-D37DB5D899BF}" type="datetimeFigureOut">
               <a:rPr lang="pt-PT" smtClean="0"/>
               <a:pPr/>
-              <a:t>01/10/2019</a:t>
+              <a:t>02/10/2019</a:t>
             </a:fld>
             <a:endParaRPr lang="pt-PT"/>
           </a:p>
@@ -4716,7 +5225,53 @@
             </a:r>
           </a:p>
           <a:p>
+            <a:pPr marL="914400" lvl="1" indent="-457200">
+              <a:buFontTx/>
+              <a:buChar char="-"/>
+            </a:pPr>
+            <a:r>
+              <a:rPr lang="en-US" dirty="0"/>
+              <a:t>Time spent reading books</a:t>
+            </a:r>
+          </a:p>
+          <a:p>
+            <a:pPr marL="914400" lvl="1" indent="-457200">
+              <a:buFontTx/>
+              <a:buChar char="-"/>
+            </a:pPr>
+            <a:r>
+              <a:rPr lang="en-US" dirty="0"/>
+              <a:t>Books household expenditure</a:t>
+            </a:r>
+          </a:p>
+          <a:p>
+            <a:pPr marL="914400" lvl="1" indent="-457200">
+              <a:buFontTx/>
+              <a:buChar char="-"/>
+            </a:pPr>
+            <a:r>
+              <a:rPr lang="en-US" dirty="0"/>
+              <a:t>Underachievement in mathematics  and science</a:t>
+            </a:r>
+          </a:p>
+          <a:p>
             <a:pPr lvl="1"/>
+            <a:endParaRPr lang="en-US" dirty="0"/>
+          </a:p>
+          <a:p>
+            <a:pPr lvl="1"/>
+            <a:endParaRPr lang="en-US" dirty="0"/>
+          </a:p>
+          <a:p>
+            <a:pPr lvl="1"/>
+            <a:r>
+              <a:rPr lang="en-US" dirty="0"/>
+              <a:t>Main Source : Eurostat and </a:t>
+            </a:r>
+            <a:r>
+              <a:rPr lang="en-US" dirty="0" err="1"/>
+              <a:t>PorData</a:t>
+            </a:r>
             <a:endParaRPr lang="en-US" dirty="0"/>
           </a:p>
         </p:txBody>

</xml_diff>